<commit_message>
Fixed pptx for real
</commit_message>
<xml_diff>
--- a/Applications-Slides.pptx
+++ b/Applications-Slides.pptx
@@ -27,7 +27,7 @@
     <p:sldId id="269" r:id="rId15"/>
     <p:sldId id="270" r:id="rId16"/>
   </p:sldIdLst>
-  <p:sldSz cx="10080625" cy="7559675" type="screen4x3"/>
+  <p:sldSz cx="10080625" cy="7559675"/>
   <p:notesSz cx="7772400" cy="10058400"/>
   <p:defaultTextStyle>
     <a:defPPr>
@@ -552,6 +552,21 @@
               <a:defRPr sz="1400"/>
             </a:pPr>
             <a:fld id="{EE259ABD-E397-4F59-9BCB-6CE7BAC78D5B}" type="slidenum">
+              <a:rPr/>
+              <a:pPr marL="0" marR="0" lvl="0" indent="0" algn="r" rtl="0" hangingPunct="0">
+                <a:lnSpc>
+                  <a:spcPct val="100000"/>
+                </a:lnSpc>
+                <a:spcBef>
+                  <a:spcPts val="0"/>
+                </a:spcBef>
+                <a:spcAft>
+                  <a:spcPts val="0"/>
+                </a:spcAft>
+                <a:buNone/>
+                <a:tabLst/>
+                <a:defRPr sz="1400"/>
+              </a:pPr>
               <a:t>‹#›</a:t>
             </a:fld>
             <a:endParaRPr lang="en-US" sz="1400" b="0" i="0" u="none" strike="noStrike" kern="1200">
@@ -814,6 +829,8 @@
           <a:p>
             <a:pPr lvl="0"/>
             <a:fld id="{EA82C823-8964-458D-A915-6BC5681714C4}" type="slidenum">
+              <a:rPr/>
+              <a:pPr lvl="0"/>
               <a:t>‹#›</a:t>
             </a:fld>
             <a:endParaRPr lang="en-US"/>
@@ -2188,6 +2205,8 @@
           <a:p>
             <a:pPr lvl="0"/>
             <a:fld id="{09F97A99-EF2A-4D74-B070-97942ACE2E1D}" type="slidenum">
+              <a:rPr/>
+              <a:pPr lvl="0"/>
               <a:t>‹#›</a:t>
             </a:fld>
             <a:endParaRPr lang="en-US"/>
@@ -2352,6 +2371,8 @@
           <a:p>
             <a:pPr lvl="0"/>
             <a:fld id="{C12DEF48-120A-43C6-A086-2BE589C0A259}" type="slidenum">
+              <a:rPr/>
+              <a:pPr lvl="0"/>
               <a:t>‹#›</a:t>
             </a:fld>
             <a:endParaRPr lang="en-US"/>
@@ -2526,6 +2547,8 @@
           <a:p>
             <a:pPr lvl="0"/>
             <a:fld id="{8F1A4FC9-4381-4754-8526-B07060631ED5}" type="slidenum">
+              <a:rPr/>
+              <a:pPr lvl="0"/>
               <a:t>‹#›</a:t>
             </a:fld>
             <a:endParaRPr lang="en-US"/>
@@ -2690,6 +2713,8 @@
           <a:p>
             <a:pPr lvl="0"/>
             <a:fld id="{79676AD5-E1EB-4D12-9DB3-15426B1B7EC9}" type="slidenum">
+              <a:rPr/>
+              <a:pPr lvl="0"/>
               <a:t>‹#›</a:t>
             </a:fld>
             <a:endParaRPr lang="en-US"/>
@@ -2930,6 +2955,8 @@
           <a:p>
             <a:pPr lvl="0"/>
             <a:fld id="{A51A3BF0-B0CB-43E7-A1AE-7CA831947B94}" type="slidenum">
+              <a:rPr/>
+              <a:pPr lvl="0"/>
               <a:t>‹#›</a:t>
             </a:fld>
             <a:endParaRPr lang="en-US"/>
@@ -3212,6 +3239,8 @@
           <a:p>
             <a:pPr lvl="0"/>
             <a:fld id="{EBB78396-DB58-482E-95C8-80BD0447DA47}" type="slidenum">
+              <a:rPr/>
+              <a:pPr lvl="0"/>
               <a:t>‹#›</a:t>
             </a:fld>
             <a:endParaRPr lang="en-US"/>
@@ -3633,6 +3662,8 @@
           <a:p>
             <a:pPr lvl="0"/>
             <a:fld id="{14855506-5F07-4E92-B900-1641F846EE72}" type="slidenum">
+              <a:rPr/>
+              <a:pPr lvl="0"/>
               <a:t>‹#›</a:t>
             </a:fld>
             <a:endParaRPr lang="en-US"/>
@@ -3745,6 +3776,8 @@
           <a:p>
             <a:pPr lvl="0"/>
             <a:fld id="{E3765202-6E81-444F-B62D-7026856492CB}" type="slidenum">
+              <a:rPr/>
+              <a:pPr lvl="0"/>
               <a:t>‹#›</a:t>
             </a:fld>
             <a:endParaRPr lang="en-US"/>
@@ -3834,6 +3867,8 @@
           <a:p>
             <a:pPr lvl="0"/>
             <a:fld id="{6CA154EC-1488-4E57-8E17-141799CB4B38}" type="slidenum">
+              <a:rPr/>
+              <a:pPr lvl="0"/>
               <a:t>‹#›</a:t>
             </a:fld>
             <a:endParaRPr lang="en-US"/>
@@ -4106,6 +4141,8 @@
           <a:p>
             <a:pPr lvl="0"/>
             <a:fld id="{624AA665-776F-4BE6-9801-8855D7372E96}" type="slidenum">
+              <a:rPr/>
+              <a:pPr lvl="0"/>
               <a:t>‹#›</a:t>
             </a:fld>
             <a:endParaRPr lang="en-US"/>
@@ -4353,6 +4390,8 @@
           <a:p>
             <a:pPr lvl="0"/>
             <a:fld id="{FDE0792C-4919-4890-BBD5-C9FCAD56CB90}" type="slidenum">
+              <a:rPr/>
+              <a:pPr lvl="0"/>
               <a:t>‹#›</a:t>
             </a:fld>
             <a:endParaRPr lang="en-US"/>
@@ -4851,6 +4890,8 @@
           <a:p>
             <a:pPr lvl="0"/>
             <a:fld id="{976D90F9-8B9C-421E-A79A-820FAE179B16}" type="slidenum">
+              <a:rPr/>
+              <a:pPr lvl="0"/>
               <a:t>‹#›</a:t>
             </a:fld>
             <a:endParaRPr lang="en-US"/>

</xml_diff>